<commit_message>
Added hands settings image
</commit_message>
<xml_diff>
--- a/Other/eng/settings.pptx
+++ b/Other/eng/settings.pptx
@@ -105,7 +105,121 @@
       </a:defRPr>
     </a:lvl9pPr>
   </p:defaultTextStyle>
+  <p:extLst>
+    <p:ext uri="{EFAFB233-063F-42B5-8137-9DF3F51BA10A}">
+      <p15:sldGuideLst xmlns:p15="http://schemas.microsoft.com/office/powerpoint/2012/main"/>
+    </p:ext>
+  </p:extLst>
 </p:presentation>
+</file>
+
+<file path=ppt/revisionInfo.xml><?xml version="1.0" encoding="utf-8"?>
+<p1510:revInfo xmlns:a="http://schemas.openxmlformats.org/drawingml/2006/main" xmlns:r="http://schemas.openxmlformats.org/officeDocument/2006/relationships" xmlns:p1510="http://schemas.microsoft.com/office/powerpoint/2015/10/main">
+  <p1510:revLst>
+    <p1510:client id="{22A5F4BA-10EF-4BCF-96BA-11A029ECC237}" v="20" dt="2020-10-09T18:48:35.729"/>
+  </p1510:revLst>
+</p1510:revInfo>
+</file>
+
+<file path=ppt/changesInfos/changesInfo1.xml><?xml version="1.0" encoding="utf-8"?>
+<pc:chgInfo xmlns:a="http://schemas.openxmlformats.org/drawingml/2006/main" xmlns:r="http://schemas.openxmlformats.org/officeDocument/2006/relationships" xmlns:ac="http://schemas.microsoft.com/office/drawing/2013/main/command" xmlns:pc="http://schemas.microsoft.com/office/powerpoint/2013/main/command">
+  <pc:docChgLst>
+    <pc:chgData name="Winston de Jong" userId="d1deabf083dfbc36" providerId="LiveId" clId="{22A5F4BA-10EF-4BCF-96BA-11A029ECC237}"/>
+    <pc:docChg chg="modSld">
+      <pc:chgData name="Winston de Jong" userId="d1deabf083dfbc36" providerId="LiveId" clId="{22A5F4BA-10EF-4BCF-96BA-11A029ECC237}" dt="2020-10-09T18:48:35.728" v="77" actId="1076"/>
+      <pc:docMkLst>
+        <pc:docMk/>
+      </pc:docMkLst>
+      <pc:sldChg chg="addSp delSp modSp mod">
+        <pc:chgData name="Winston de Jong" userId="d1deabf083dfbc36" providerId="LiveId" clId="{22A5F4BA-10EF-4BCF-96BA-11A029ECC237}" dt="2020-10-09T18:48:35.728" v="77" actId="1076"/>
+        <pc:sldMkLst>
+          <pc:docMk/>
+          <pc:sldMk cId="1892046867" sldId="256"/>
+        </pc:sldMkLst>
+        <pc:spChg chg="add del mod">
+          <ac:chgData name="Winston de Jong" userId="d1deabf083dfbc36" providerId="LiveId" clId="{22A5F4BA-10EF-4BCF-96BA-11A029ECC237}" dt="2020-10-09T18:46:38.775" v="20"/>
+          <ac:spMkLst>
+            <pc:docMk/>
+            <pc:sldMk cId="1892046867" sldId="256"/>
+            <ac:spMk id="37" creationId="{7BA37761-5D27-44D4-9DE4-9FF01F62ADD9}"/>
+          </ac:spMkLst>
+        </pc:spChg>
+        <pc:spChg chg="add mod">
+          <ac:chgData name="Winston de Jong" userId="d1deabf083dfbc36" providerId="LiveId" clId="{22A5F4BA-10EF-4BCF-96BA-11A029ECC237}" dt="2020-10-09T18:47:18.502" v="32" actId="1076"/>
+          <ac:spMkLst>
+            <pc:docMk/>
+            <pc:sldMk cId="1892046867" sldId="256"/>
+            <ac:spMk id="38" creationId="{8C3E3F21-0EDB-4D25-BE61-FBF57B69B765}"/>
+          </ac:spMkLst>
+        </pc:spChg>
+        <pc:spChg chg="add mod">
+          <ac:chgData name="Winston de Jong" userId="d1deabf083dfbc36" providerId="LiveId" clId="{22A5F4BA-10EF-4BCF-96BA-11A029ECC237}" dt="2020-10-09T18:47:53.809" v="45" actId="20577"/>
+          <ac:spMkLst>
+            <pc:docMk/>
+            <pc:sldMk cId="1892046867" sldId="256"/>
+            <ac:spMk id="40" creationId="{037ECBBB-1655-47AC-8DD2-797ED24422AA}"/>
+          </ac:spMkLst>
+        </pc:spChg>
+        <pc:spChg chg="add mod">
+          <ac:chgData name="Winston de Jong" userId="d1deabf083dfbc36" providerId="LiveId" clId="{22A5F4BA-10EF-4BCF-96BA-11A029ECC237}" dt="2020-10-09T18:48:10.310" v="73" actId="20577"/>
+          <ac:spMkLst>
+            <pc:docMk/>
+            <pc:sldMk cId="1892046867" sldId="256"/>
+            <ac:spMk id="42" creationId="{D34F1B68-0304-45A7-8E46-3FBF4E223ECF}"/>
+          </ac:spMkLst>
+        </pc:spChg>
+        <pc:spChg chg="add mod">
+          <ac:chgData name="Winston de Jong" userId="d1deabf083dfbc36" providerId="LiveId" clId="{22A5F4BA-10EF-4BCF-96BA-11A029ECC237}" dt="2020-10-09T18:48:07.177" v="65" actId="20577"/>
+          <ac:spMkLst>
+            <pc:docMk/>
+            <pc:sldMk cId="1892046867" sldId="256"/>
+            <ac:spMk id="44" creationId="{21E7812E-FA26-4ADB-8991-5A7821E459D2}"/>
+          </ac:spMkLst>
+        </pc:spChg>
+        <pc:grpChg chg="add del mod">
+          <ac:chgData name="Winston de Jong" userId="d1deabf083dfbc36" providerId="LiveId" clId="{22A5F4BA-10EF-4BCF-96BA-11A029ECC237}" dt="2020-10-09T18:44:10.036" v="4" actId="165"/>
+          <ac:grpSpMkLst>
+            <pc:docMk/>
+            <pc:sldMk cId="1892046867" sldId="256"/>
+            <ac:grpSpMk id="32" creationId="{BA90C371-ED49-4053-8545-4D5D350C214D}"/>
+          </ac:grpSpMkLst>
+        </pc:grpChg>
+        <pc:picChg chg="add mod topLvl">
+          <ac:chgData name="Winston de Jong" userId="d1deabf083dfbc36" providerId="LiveId" clId="{22A5F4BA-10EF-4BCF-96BA-11A029ECC237}" dt="2020-10-09T18:48:35.728" v="77" actId="1076"/>
+          <ac:picMkLst>
+            <pc:docMk/>
+            <pc:sldMk cId="1892046867" sldId="256"/>
+            <ac:picMk id="33" creationId="{936B402A-C6FE-4066-B6FE-0EF885E3EC9C}"/>
+          </ac:picMkLst>
+        </pc:picChg>
+        <pc:picChg chg="add mod topLvl">
+          <ac:chgData name="Winston de Jong" userId="d1deabf083dfbc36" providerId="LiveId" clId="{22A5F4BA-10EF-4BCF-96BA-11A029ECC237}" dt="2020-10-09T18:46:52.358" v="24" actId="1076"/>
+          <ac:picMkLst>
+            <pc:docMk/>
+            <pc:sldMk cId="1892046867" sldId="256"/>
+            <ac:picMk id="34" creationId="{32FD1984-4930-4211-B821-2DADC4C37117}"/>
+          </ac:picMkLst>
+        </pc:picChg>
+        <pc:picChg chg="add mod topLvl">
+          <ac:chgData name="Winston de Jong" userId="d1deabf083dfbc36" providerId="LiveId" clId="{22A5F4BA-10EF-4BCF-96BA-11A029ECC237}" dt="2020-10-09T18:46:58.332" v="25" actId="1076"/>
+          <ac:picMkLst>
+            <pc:docMk/>
+            <pc:sldMk cId="1892046867" sldId="256"/>
+            <ac:picMk id="35" creationId="{C909E412-AB4B-442A-995F-D3744809978C}"/>
+          </ac:picMkLst>
+        </pc:picChg>
+        <pc:picChg chg="add mod topLvl">
+          <ac:chgData name="Winston de Jong" userId="d1deabf083dfbc36" providerId="LiveId" clId="{22A5F4BA-10EF-4BCF-96BA-11A029ECC237}" dt="2020-10-09T18:48:28.499" v="76" actId="1076"/>
+          <ac:picMkLst>
+            <pc:docMk/>
+            <pc:sldMk cId="1892046867" sldId="256"/>
+            <ac:picMk id="36" creationId="{DC53ED14-44A9-421B-95CE-9E399929F85F}"/>
+          </ac:picMkLst>
+        </pc:picChg>
+      </pc:sldChg>
+    </pc:docChg>
+  </pc:docChgLst>
+</pc:chgInfo>
 </file>
 
 <file path=ppt/slideLayouts/slideLayout1.xml><?xml version="1.0" encoding="utf-8"?>
@@ -5643,6 +5757,446 @@
           </a:p>
         </p:txBody>
       </p:sp>
+      <p:pic>
+        <p:nvPicPr>
+          <p:cNvPr id="33" name="Picture 32">
+            <a:extLst>
+              <a:ext uri="{FF2B5EF4-FFF2-40B4-BE49-F238E27FC236}">
+                <a16:creationId xmlns:a16="http://schemas.microsoft.com/office/drawing/2014/main" id="{936B402A-C6FE-4066-B6FE-0EF885E3EC9C}"/>
+              </a:ext>
+            </a:extLst>
+          </p:cNvPr>
+          <p:cNvPicPr>
+            <a:picLocks noChangeAspect="1" noChangeArrowheads="1"/>
+          </p:cNvPicPr>
+          <p:nvPr/>
+        </p:nvPicPr>
+        <p:blipFill>
+          <a:blip r:embed="rId2" cstate="print">
+            <a:extLst>
+              <a:ext uri="{28A0092B-C50C-407E-A947-70E740481C1C}">
+                <a14:useLocalDpi xmlns:a14="http://schemas.microsoft.com/office/drawing/2010/main" val="0"/>
+              </a:ext>
+            </a:extLst>
+          </a:blip>
+          <a:srcRect/>
+          <a:stretch>
+            <a:fillRect/>
+          </a:stretch>
+        </p:blipFill>
+        <p:spPr bwMode="auto">
+          <a:xfrm>
+            <a:off x="6739277" y="4794568"/>
+            <a:ext cx="665730" cy="934341"/>
+          </a:xfrm>
+          <a:prstGeom prst="rect">
+            <a:avLst/>
+          </a:prstGeom>
+          <a:noFill/>
+          <a:ln>
+            <a:noFill/>
+          </a:ln>
+          <a:effectLst/>
+          <a:extLst>
+            <a:ext uri="{909E8E84-426E-40DD-AFC4-6F175D3DCCD1}">
+              <a14:hiddenFill xmlns:a14="http://schemas.microsoft.com/office/drawing/2010/main">
+                <a:solidFill>
+                  <a:srgbClr val="5B9BD5"/>
+                </a:solidFill>
+              </a14:hiddenFill>
+            </a:ext>
+            <a:ext uri="{91240B29-F687-4F45-9708-019B960494DF}">
+              <a14:hiddenLine xmlns:a14="http://schemas.microsoft.com/office/drawing/2010/main" w="25400">
+                <a:solidFill>
+                  <a:schemeClr val="dk1">
+                    <a:lumMod val="0"/>
+                    <a:lumOff val="0"/>
+                  </a:schemeClr>
+                </a:solidFill>
+                <a:miter lim="800000"/>
+                <a:headEnd/>
+                <a:tailEnd/>
+              </a14:hiddenLine>
+            </a:ext>
+            <a:ext uri="{AF507438-7753-43E0-B8FC-AC1667EBCBE1}">
+              <a14:hiddenEffects xmlns:a14="http://schemas.microsoft.com/office/drawing/2010/main">
+                <a:effectLst>
+                  <a:outerShdw algn="ctr" rotWithShape="0">
+                    <a:srgbClr val="000000">
+                      <a:alpha val="0"/>
+                    </a:srgbClr>
+                  </a:outerShdw>
+                </a:effectLst>
+              </a14:hiddenEffects>
+            </a:ext>
+          </a:extLst>
+        </p:spPr>
+      </p:pic>
+      <p:pic>
+        <p:nvPicPr>
+          <p:cNvPr id="34" name="Picture 33">
+            <a:extLst>
+              <a:ext uri="{FF2B5EF4-FFF2-40B4-BE49-F238E27FC236}">
+                <a16:creationId xmlns:a16="http://schemas.microsoft.com/office/drawing/2014/main" id="{32FD1984-4930-4211-B821-2DADC4C37117}"/>
+              </a:ext>
+            </a:extLst>
+          </p:cNvPr>
+          <p:cNvPicPr>
+            <a:picLocks noChangeAspect="1" noChangeArrowheads="1"/>
+          </p:cNvPicPr>
+          <p:nvPr/>
+        </p:nvPicPr>
+        <p:blipFill>
+          <a:blip r:embed="rId3" cstate="print">
+            <a:extLst>
+              <a:ext uri="{28A0092B-C50C-407E-A947-70E740481C1C}">
+                <a14:useLocalDpi xmlns:a14="http://schemas.microsoft.com/office/drawing/2010/main" val="0"/>
+              </a:ext>
+            </a:extLst>
+          </a:blip>
+          <a:srcRect r="12321"/>
+          <a:stretch>
+            <a:fillRect/>
+          </a:stretch>
+        </p:blipFill>
+        <p:spPr bwMode="auto">
+          <a:xfrm>
+            <a:off x="6578825" y="2966494"/>
+            <a:ext cx="685970" cy="923870"/>
+          </a:xfrm>
+          <a:prstGeom prst="rect">
+            <a:avLst/>
+          </a:prstGeom>
+          <a:noFill/>
+          <a:ln>
+            <a:noFill/>
+          </a:ln>
+          <a:effectLst/>
+          <a:extLst>
+            <a:ext uri="{909E8E84-426E-40DD-AFC4-6F175D3DCCD1}">
+              <a14:hiddenFill xmlns:a14="http://schemas.microsoft.com/office/drawing/2010/main">
+                <a:solidFill>
+                  <a:srgbClr val="5B9BD5"/>
+                </a:solidFill>
+              </a14:hiddenFill>
+            </a:ext>
+            <a:ext uri="{91240B29-F687-4F45-9708-019B960494DF}">
+              <a14:hiddenLine xmlns:a14="http://schemas.microsoft.com/office/drawing/2010/main" w="25400">
+                <a:solidFill>
+                  <a:schemeClr val="dk1">
+                    <a:lumMod val="0"/>
+                    <a:lumOff val="0"/>
+                  </a:schemeClr>
+                </a:solidFill>
+                <a:miter lim="800000"/>
+                <a:headEnd/>
+                <a:tailEnd/>
+              </a14:hiddenLine>
+            </a:ext>
+            <a:ext uri="{AF507438-7753-43E0-B8FC-AC1667EBCBE1}">
+              <a14:hiddenEffects xmlns:a14="http://schemas.microsoft.com/office/drawing/2010/main">
+                <a:effectLst>
+                  <a:outerShdw algn="ctr" rotWithShape="0">
+                    <a:srgbClr val="000000">
+                      <a:alpha val="0"/>
+                    </a:srgbClr>
+                  </a:outerShdw>
+                </a:effectLst>
+              </a14:hiddenEffects>
+            </a:ext>
+          </a:extLst>
+        </p:spPr>
+      </p:pic>
+      <p:pic>
+        <p:nvPicPr>
+          <p:cNvPr id="35" name="Picture 34">
+            <a:extLst>
+              <a:ext uri="{FF2B5EF4-FFF2-40B4-BE49-F238E27FC236}">
+                <a16:creationId xmlns:a16="http://schemas.microsoft.com/office/drawing/2014/main" id="{C909E412-AB4B-442A-995F-D3744809978C}"/>
+              </a:ext>
+            </a:extLst>
+          </p:cNvPr>
+          <p:cNvPicPr>
+            <a:picLocks noChangeAspect="1" noChangeArrowheads="1"/>
+          </p:cNvPicPr>
+          <p:nvPr/>
+        </p:nvPicPr>
+        <p:blipFill>
+          <a:blip r:embed="rId4" cstate="print">
+            <a:extLst>
+              <a:ext uri="{28A0092B-C50C-407E-A947-70E740481C1C}">
+                <a14:useLocalDpi xmlns:a14="http://schemas.microsoft.com/office/drawing/2010/main" val="0"/>
+              </a:ext>
+            </a:extLst>
+          </a:blip>
+          <a:srcRect/>
+          <a:stretch>
+            <a:fillRect/>
+          </a:stretch>
+        </p:blipFill>
+        <p:spPr bwMode="auto">
+          <a:xfrm>
+            <a:off x="6640013" y="2083191"/>
+            <a:ext cx="619945" cy="933272"/>
+          </a:xfrm>
+          <a:prstGeom prst="rect">
+            <a:avLst/>
+          </a:prstGeom>
+          <a:noFill/>
+          <a:ln>
+            <a:noFill/>
+          </a:ln>
+          <a:effectLst/>
+          <a:extLst>
+            <a:ext uri="{909E8E84-426E-40DD-AFC4-6F175D3DCCD1}">
+              <a14:hiddenFill xmlns:a14="http://schemas.microsoft.com/office/drawing/2010/main">
+                <a:solidFill>
+                  <a:srgbClr val="5B9BD5"/>
+                </a:solidFill>
+              </a14:hiddenFill>
+            </a:ext>
+            <a:ext uri="{91240B29-F687-4F45-9708-019B960494DF}">
+              <a14:hiddenLine xmlns:a14="http://schemas.microsoft.com/office/drawing/2010/main" w="25400">
+                <a:solidFill>
+                  <a:schemeClr val="dk1">
+                    <a:lumMod val="0"/>
+                    <a:lumOff val="0"/>
+                  </a:schemeClr>
+                </a:solidFill>
+                <a:miter lim="800000"/>
+                <a:headEnd/>
+                <a:tailEnd/>
+              </a14:hiddenLine>
+            </a:ext>
+            <a:ext uri="{AF507438-7753-43E0-B8FC-AC1667EBCBE1}">
+              <a14:hiddenEffects xmlns:a14="http://schemas.microsoft.com/office/drawing/2010/main">
+                <a:effectLst>
+                  <a:outerShdw algn="ctr" rotWithShape="0">
+                    <a:srgbClr val="000000">
+                      <a:alpha val="0"/>
+                    </a:srgbClr>
+                  </a:outerShdw>
+                </a:effectLst>
+              </a14:hiddenEffects>
+            </a:ext>
+          </a:extLst>
+        </p:spPr>
+      </p:pic>
+      <p:pic>
+        <p:nvPicPr>
+          <p:cNvPr id="36" name="Picture 35">
+            <a:extLst>
+              <a:ext uri="{FF2B5EF4-FFF2-40B4-BE49-F238E27FC236}">
+                <a16:creationId xmlns:a16="http://schemas.microsoft.com/office/drawing/2014/main" id="{DC53ED14-44A9-421B-95CE-9E399929F85F}"/>
+              </a:ext>
+            </a:extLst>
+          </p:cNvPr>
+          <p:cNvPicPr>
+            <a:picLocks noChangeAspect="1" noChangeArrowheads="1"/>
+          </p:cNvPicPr>
+          <p:nvPr/>
+        </p:nvPicPr>
+        <p:blipFill>
+          <a:blip r:embed="rId5" cstate="print">
+            <a:extLst>
+              <a:ext uri="{28A0092B-C50C-407E-A947-70E740481C1C}">
+                <a14:useLocalDpi xmlns:a14="http://schemas.microsoft.com/office/drawing/2010/main" val="0"/>
+              </a:ext>
+            </a:extLst>
+          </a:blip>
+          <a:srcRect b="15297"/>
+          <a:stretch>
+            <a:fillRect/>
+          </a:stretch>
+        </p:blipFill>
+        <p:spPr bwMode="auto">
+          <a:xfrm>
+            <a:off x="6636089" y="3904504"/>
+            <a:ext cx="676296" cy="915448"/>
+          </a:xfrm>
+          <a:prstGeom prst="rect">
+            <a:avLst/>
+          </a:prstGeom>
+          <a:noFill/>
+          <a:ln>
+            <a:noFill/>
+          </a:ln>
+          <a:effectLst/>
+          <a:extLst>
+            <a:ext uri="{909E8E84-426E-40DD-AFC4-6F175D3DCCD1}">
+              <a14:hiddenFill xmlns:a14="http://schemas.microsoft.com/office/drawing/2010/main">
+                <a:solidFill>
+                  <a:srgbClr val="5B9BD5"/>
+                </a:solidFill>
+              </a14:hiddenFill>
+            </a:ext>
+            <a:ext uri="{91240B29-F687-4F45-9708-019B960494DF}">
+              <a14:hiddenLine xmlns:a14="http://schemas.microsoft.com/office/drawing/2010/main" w="25400">
+                <a:solidFill>
+                  <a:schemeClr val="dk1">
+                    <a:lumMod val="0"/>
+                    <a:lumOff val="0"/>
+                  </a:schemeClr>
+                </a:solidFill>
+                <a:miter lim="800000"/>
+                <a:headEnd/>
+                <a:tailEnd/>
+              </a14:hiddenLine>
+            </a:ext>
+            <a:ext uri="{AF507438-7753-43E0-B8FC-AC1667EBCBE1}">
+              <a14:hiddenEffects xmlns:a14="http://schemas.microsoft.com/office/drawing/2010/main">
+                <a:effectLst>
+                  <a:outerShdw algn="ctr" rotWithShape="0">
+                    <a:srgbClr val="000000">
+                      <a:alpha val="0"/>
+                    </a:srgbClr>
+                  </a:outerShdw>
+                </a:effectLst>
+              </a14:hiddenEffects>
+            </a:ext>
+          </a:extLst>
+        </p:spPr>
+      </p:pic>
+      <p:sp>
+        <p:nvSpPr>
+          <p:cNvPr id="38" name="TextBox 37">
+            <a:extLst>
+              <a:ext uri="{FF2B5EF4-FFF2-40B4-BE49-F238E27FC236}">
+                <a16:creationId xmlns:a16="http://schemas.microsoft.com/office/drawing/2014/main" id="{8C3E3F21-0EDB-4D25-BE61-FBF57B69B765}"/>
+              </a:ext>
+            </a:extLst>
+          </p:cNvPr>
+          <p:cNvSpPr txBox="1"/>
+          <p:nvPr/>
+        </p:nvSpPr>
+        <p:spPr>
+          <a:xfrm>
+            <a:off x="7405007" y="2365161"/>
+            <a:ext cx="2041072" cy="369332"/>
+          </a:xfrm>
+          <a:prstGeom prst="rect">
+            <a:avLst/>
+          </a:prstGeom>
+          <a:noFill/>
+        </p:spPr>
+        <p:txBody>
+          <a:bodyPr wrap="square" rtlCol="0">
+            <a:spAutoFit/>
+          </a:bodyPr>
+          <a:lstStyle/>
+          <a:p>
+            <a:r>
+              <a:rPr lang="en-US" dirty="0"/>
+              <a:t>Plain</a:t>
+            </a:r>
+          </a:p>
+        </p:txBody>
+      </p:sp>
+      <p:sp>
+        <p:nvSpPr>
+          <p:cNvPr id="40" name="TextBox 39">
+            <a:extLst>
+              <a:ext uri="{FF2B5EF4-FFF2-40B4-BE49-F238E27FC236}">
+                <a16:creationId xmlns:a16="http://schemas.microsoft.com/office/drawing/2014/main" id="{037ECBBB-1655-47AC-8DD2-797ED24422AA}"/>
+              </a:ext>
+            </a:extLst>
+          </p:cNvPr>
+          <p:cNvSpPr txBox="1"/>
+          <p:nvPr/>
+        </p:nvSpPr>
+        <p:spPr>
+          <a:xfrm>
+            <a:off x="7405007" y="3243763"/>
+            <a:ext cx="2041072" cy="369332"/>
+          </a:xfrm>
+          <a:prstGeom prst="rect">
+            <a:avLst/>
+          </a:prstGeom>
+          <a:noFill/>
+        </p:spPr>
+        <p:txBody>
+          <a:bodyPr wrap="square" rtlCol="0">
+            <a:spAutoFit/>
+          </a:bodyPr>
+          <a:lstStyle/>
+          <a:p>
+            <a:r>
+              <a:rPr lang="en-US" dirty="0"/>
+              <a:t>Circle</a:t>
+            </a:r>
+          </a:p>
+        </p:txBody>
+      </p:sp>
+      <p:sp>
+        <p:nvSpPr>
+          <p:cNvPr id="42" name="TextBox 41">
+            <a:extLst>
+              <a:ext uri="{FF2B5EF4-FFF2-40B4-BE49-F238E27FC236}">
+                <a16:creationId xmlns:a16="http://schemas.microsoft.com/office/drawing/2014/main" id="{D34F1B68-0304-45A7-8E46-3FBF4E223ECF}"/>
+              </a:ext>
+            </a:extLst>
+          </p:cNvPr>
+          <p:cNvSpPr txBox="1"/>
+          <p:nvPr/>
+        </p:nvSpPr>
+        <p:spPr>
+          <a:xfrm>
+            <a:off x="7405007" y="4122365"/>
+            <a:ext cx="2041072" cy="369332"/>
+          </a:xfrm>
+          <a:prstGeom prst="rect">
+            <a:avLst/>
+          </a:prstGeom>
+          <a:noFill/>
+        </p:spPr>
+        <p:txBody>
+          <a:bodyPr wrap="square" rtlCol="0">
+            <a:spAutoFit/>
+          </a:bodyPr>
+          <a:lstStyle/>
+          <a:p>
+            <a:r>
+              <a:rPr lang="en-US" dirty="0"/>
+              <a:t>Pointer</a:t>
+            </a:r>
+          </a:p>
+        </p:txBody>
+      </p:sp>
+      <p:sp>
+        <p:nvSpPr>
+          <p:cNvPr id="44" name="TextBox 43">
+            <a:extLst>
+              <a:ext uri="{FF2B5EF4-FFF2-40B4-BE49-F238E27FC236}">
+                <a16:creationId xmlns:a16="http://schemas.microsoft.com/office/drawing/2014/main" id="{21E7812E-FA26-4ADB-8991-5A7821E459D2}"/>
+              </a:ext>
+            </a:extLst>
+          </p:cNvPr>
+          <p:cNvSpPr txBox="1"/>
+          <p:nvPr/>
+        </p:nvSpPr>
+        <p:spPr>
+          <a:xfrm>
+            <a:off x="7405007" y="5077073"/>
+            <a:ext cx="2041072" cy="369332"/>
+          </a:xfrm>
+          <a:prstGeom prst="rect">
+            <a:avLst/>
+          </a:prstGeom>
+          <a:noFill/>
+        </p:spPr>
+        <p:txBody>
+          <a:bodyPr wrap="square" rtlCol="0">
+            <a:spAutoFit/>
+          </a:bodyPr>
+          <a:lstStyle/>
+          <a:p>
+            <a:r>
+              <a:rPr lang="en-US" dirty="0"/>
+              <a:t>Arrow</a:t>
+            </a:r>
+          </a:p>
+        </p:txBody>
+      </p:sp>
     </p:spTree>
     <p:extLst>
       <p:ext uri="{BB962C8B-B14F-4D97-AF65-F5344CB8AC3E}">
@@ -5694,7 +6248,7 @@
           <a:bodyPr/>
           <a:lstStyle/>
           <a:p>
-            <a:endParaRPr lang="en-US"/>
+            <a:endParaRPr lang="en-US" dirty="0"/>
           </a:p>
         </p:txBody>
       </p:sp>

</xml_diff>